<commit_message>
added into to ppt
</commit_message>
<xml_diff>
--- a/Amazon Sales Analysis.pptx
+++ b/Amazon Sales Analysis.pptx
@@ -10,10 +10,11 @@
     <p:sldId id="258" r:id="rId4"/>
     <p:sldId id="259" r:id="rId5"/>
     <p:sldId id="263" r:id="rId6"/>
-    <p:sldId id="260" r:id="rId7"/>
-    <p:sldId id="261" r:id="rId8"/>
-    <p:sldId id="262" r:id="rId9"/>
-    <p:sldId id="266" r:id="rId10"/>
+    <p:sldId id="267" r:id="rId7"/>
+    <p:sldId id="260" r:id="rId8"/>
+    <p:sldId id="261" r:id="rId9"/>
+    <p:sldId id="262" r:id="rId10"/>
+    <p:sldId id="266" r:id="rId11"/>
   </p:sldIdLst>
   <p:sldSz cx="12192000" cy="6858000"/>
   <p:notesSz cx="6858000" cy="9144000"/>
@@ -267,7 +268,7 @@
           <a:p>
             <a:fld id="{9A374940-3207-4E51-90DA-3E6D9C4BFA03}" type="datetimeFigureOut">
               <a:rPr lang="en-US" smtClean="0"/>
-              <a:t>8/17/2018</a:t>
+              <a:t>8/18/2018</a:t>
             </a:fld>
             <a:endParaRPr lang="en-US"/>
           </a:p>
@@ -465,7 +466,7 @@
           <a:p>
             <a:fld id="{9A374940-3207-4E51-90DA-3E6D9C4BFA03}" type="datetimeFigureOut">
               <a:rPr lang="en-US" smtClean="0"/>
-              <a:t>8/17/2018</a:t>
+              <a:t>8/18/2018</a:t>
             </a:fld>
             <a:endParaRPr lang="en-US"/>
           </a:p>
@@ -673,7 +674,7 @@
           <a:p>
             <a:fld id="{9A374940-3207-4E51-90DA-3E6D9C4BFA03}" type="datetimeFigureOut">
               <a:rPr lang="en-US" smtClean="0"/>
-              <a:t>8/17/2018</a:t>
+              <a:t>8/18/2018</a:t>
             </a:fld>
             <a:endParaRPr lang="en-US"/>
           </a:p>
@@ -871,7 +872,7 @@
           <a:p>
             <a:fld id="{9A374940-3207-4E51-90DA-3E6D9C4BFA03}" type="datetimeFigureOut">
               <a:rPr lang="en-US" smtClean="0"/>
-              <a:t>8/17/2018</a:t>
+              <a:t>8/18/2018</a:t>
             </a:fld>
             <a:endParaRPr lang="en-US"/>
           </a:p>
@@ -1146,7 +1147,7 @@
           <a:p>
             <a:fld id="{9A374940-3207-4E51-90DA-3E6D9C4BFA03}" type="datetimeFigureOut">
               <a:rPr lang="en-US" smtClean="0"/>
-              <a:t>8/17/2018</a:t>
+              <a:t>8/18/2018</a:t>
             </a:fld>
             <a:endParaRPr lang="en-US"/>
           </a:p>
@@ -1411,7 +1412,7 @@
           <a:p>
             <a:fld id="{9A374940-3207-4E51-90DA-3E6D9C4BFA03}" type="datetimeFigureOut">
               <a:rPr lang="en-US" smtClean="0"/>
-              <a:t>8/17/2018</a:t>
+              <a:t>8/18/2018</a:t>
             </a:fld>
             <a:endParaRPr lang="en-US"/>
           </a:p>
@@ -1823,7 +1824,7 @@
           <a:p>
             <a:fld id="{9A374940-3207-4E51-90DA-3E6D9C4BFA03}" type="datetimeFigureOut">
               <a:rPr lang="en-US" smtClean="0"/>
-              <a:t>8/17/2018</a:t>
+              <a:t>8/18/2018</a:t>
             </a:fld>
             <a:endParaRPr lang="en-US"/>
           </a:p>
@@ -1964,7 +1965,7 @@
           <a:p>
             <a:fld id="{9A374940-3207-4E51-90DA-3E6D9C4BFA03}" type="datetimeFigureOut">
               <a:rPr lang="en-US" smtClean="0"/>
-              <a:t>8/17/2018</a:t>
+              <a:t>8/18/2018</a:t>
             </a:fld>
             <a:endParaRPr lang="en-US"/>
           </a:p>
@@ -2077,7 +2078,7 @@
           <a:p>
             <a:fld id="{9A374940-3207-4E51-90DA-3E6D9C4BFA03}" type="datetimeFigureOut">
               <a:rPr lang="en-US" smtClean="0"/>
-              <a:t>8/17/2018</a:t>
+              <a:t>8/18/2018</a:t>
             </a:fld>
             <a:endParaRPr lang="en-US"/>
           </a:p>
@@ -2388,7 +2389,7 @@
           <a:p>
             <a:fld id="{9A374940-3207-4E51-90DA-3E6D9C4BFA03}" type="datetimeFigureOut">
               <a:rPr lang="en-US" smtClean="0"/>
-              <a:t>8/17/2018</a:t>
+              <a:t>8/18/2018</a:t>
             </a:fld>
             <a:endParaRPr lang="en-US"/>
           </a:p>
@@ -2676,7 +2677,7 @@
           <a:p>
             <a:fld id="{9A374940-3207-4E51-90DA-3E6D9C4BFA03}" type="datetimeFigureOut">
               <a:rPr lang="en-US" smtClean="0"/>
-              <a:t>8/17/2018</a:t>
+              <a:t>8/18/2018</a:t>
             </a:fld>
             <a:endParaRPr lang="en-US"/>
           </a:p>
@@ -2917,7 +2918,7 @@
           <a:p>
             <a:fld id="{9A374940-3207-4E51-90DA-3E6D9C4BFA03}" type="datetimeFigureOut">
               <a:rPr lang="en-US" smtClean="0"/>
-              <a:t>8/17/2018</a:t>
+              <a:t>8/18/2018</a:t>
             </a:fld>
             <a:endParaRPr lang="en-US"/>
           </a:p>
@@ -3468,6 +3469,504 @@
 </p:sld>
 </file>
 
+<file path=ppt/slides/slide10.xml><?xml version="1.0" encoding="utf-8"?>
+<p:sld xmlns:a="http://schemas.openxmlformats.org/drawingml/2006/main" xmlns:r="http://schemas.openxmlformats.org/officeDocument/2006/relationships" xmlns:p="http://schemas.openxmlformats.org/presentationml/2006/main">
+  <p:cSld>
+    <p:spTree>
+      <p:nvGrpSpPr>
+        <p:cNvPr id="1" name=""/>
+        <p:cNvGrpSpPr/>
+        <p:nvPr/>
+      </p:nvGrpSpPr>
+      <p:grpSpPr>
+        <a:xfrm>
+          <a:off x="0" y="0"/>
+          <a:ext cx="0" cy="0"/>
+          <a:chOff x="0" y="0"/>
+          <a:chExt cx="0" cy="0"/>
+        </a:xfrm>
+      </p:grpSpPr>
+      <p:sp>
+        <p:nvSpPr>
+          <p:cNvPr id="2" name="Title 1">
+            <a:extLst>
+              <a:ext uri="{FF2B5EF4-FFF2-40B4-BE49-F238E27FC236}">
+                <a16:creationId xmlns:a16="http://schemas.microsoft.com/office/drawing/2014/main" id="{8176E52F-1353-4CE6-AB22-7FCE202250F4}"/>
+              </a:ext>
+            </a:extLst>
+          </p:cNvPr>
+          <p:cNvSpPr>
+            <a:spLocks noGrp="1"/>
+          </p:cNvSpPr>
+          <p:nvPr>
+            <p:ph type="title"/>
+          </p:nvPr>
+        </p:nvSpPr>
+        <p:spPr>
+          <a:xfrm>
+            <a:off x="112336" y="3397823"/>
+            <a:ext cx="10515600" cy="1325563"/>
+          </a:xfrm>
+        </p:spPr>
+        <p:txBody>
+          <a:bodyPr/>
+          <a:lstStyle/>
+          <a:p>
+            <a:r>
+              <a:rPr lang="en-US" dirty="0"/>
+              <a:t>Future Considerations</a:t>
+            </a:r>
+          </a:p>
+        </p:txBody>
+      </p:sp>
+      <p:sp>
+        <p:nvSpPr>
+          <p:cNvPr id="3" name="Content Placeholder 2">
+            <a:extLst>
+              <a:ext uri="{FF2B5EF4-FFF2-40B4-BE49-F238E27FC236}">
+                <a16:creationId xmlns:a16="http://schemas.microsoft.com/office/drawing/2014/main" id="{D1F36D57-EB51-459C-BC47-FE4A9EBD56F6}"/>
+              </a:ext>
+            </a:extLst>
+          </p:cNvPr>
+          <p:cNvSpPr>
+            <a:spLocks noGrp="1"/>
+          </p:cNvSpPr>
+          <p:nvPr>
+            <p:ph idx="1"/>
+          </p:nvPr>
+        </p:nvSpPr>
+        <p:spPr>
+          <a:xfrm>
+            <a:off x="112336" y="4465130"/>
+            <a:ext cx="10515600" cy="1325563"/>
+          </a:xfrm>
+        </p:spPr>
+        <p:txBody>
+          <a:bodyPr>
+            <a:normAutofit fontScale="92500" lnSpcReduction="10000"/>
+          </a:bodyPr>
+          <a:lstStyle/>
+          <a:p>
+            <a:r>
+              <a:rPr lang="en-US" dirty="0"/>
+              <a:t>Add more data</a:t>
+            </a:r>
+          </a:p>
+          <a:p>
+            <a:r>
+              <a:rPr lang="en-US" dirty="0"/>
+              <a:t>Automated reporting through API</a:t>
+            </a:r>
+          </a:p>
+          <a:p>
+            <a:r>
+              <a:rPr lang="en-US" dirty="0"/>
+              <a:t>Automated adjustments on advertising or price</a:t>
+            </a:r>
+          </a:p>
+          <a:p>
+            <a:endParaRPr lang="en-US" dirty="0"/>
+          </a:p>
+          <a:p>
+            <a:endParaRPr lang="en-US" dirty="0"/>
+          </a:p>
+          <a:p>
+            <a:pPr marL="0" indent="0">
+              <a:buNone/>
+            </a:pPr>
+            <a:endParaRPr lang="en-US" dirty="0"/>
+          </a:p>
+        </p:txBody>
+      </p:sp>
+      <p:sp>
+        <p:nvSpPr>
+          <p:cNvPr id="4" name="Title 1">
+            <a:extLst>
+              <a:ext uri="{FF2B5EF4-FFF2-40B4-BE49-F238E27FC236}">
+                <a16:creationId xmlns:a16="http://schemas.microsoft.com/office/drawing/2014/main" id="{B8B5D1E9-610D-4427-8167-EC921DC2A02F}"/>
+              </a:ext>
+            </a:extLst>
+          </p:cNvPr>
+          <p:cNvSpPr txBox="1">
+            <a:spLocks/>
+          </p:cNvSpPr>
+          <p:nvPr/>
+        </p:nvSpPr>
+        <p:spPr>
+          <a:xfrm>
+            <a:off x="4271128" y="5532437"/>
+            <a:ext cx="10515600" cy="1325563"/>
+          </a:xfrm>
+          <a:prstGeom prst="rect">
+            <a:avLst/>
+          </a:prstGeom>
+        </p:spPr>
+        <p:txBody>
+          <a:bodyPr vert="horz" lIns="91440" tIns="45720" rIns="91440" bIns="45720" rtlCol="0" anchor="ctr">
+            <a:normAutofit/>
+          </a:bodyPr>
+          <a:lstStyle>
+            <a:lvl1pPr algn="l" defTabSz="914400" rtl="0" eaLnBrk="1" latinLnBrk="0" hangingPunct="1">
+              <a:lnSpc>
+                <a:spcPct val="90000"/>
+              </a:lnSpc>
+              <a:spcBef>
+                <a:spcPct val="0"/>
+              </a:spcBef>
+              <a:buNone/>
+              <a:defRPr sz="4400" kern="1200">
+                <a:solidFill>
+                  <a:schemeClr val="tx1"/>
+                </a:solidFill>
+                <a:latin typeface="+mj-lt"/>
+                <a:ea typeface="+mj-ea"/>
+                <a:cs typeface="+mj-cs"/>
+              </a:defRPr>
+            </a:lvl1pPr>
+          </a:lstStyle>
+          <a:p>
+            <a:r>
+              <a:rPr lang="en-US" dirty="0"/>
+              <a:t>Thank You!!!</a:t>
+            </a:r>
+          </a:p>
+        </p:txBody>
+      </p:sp>
+      <p:sp>
+        <p:nvSpPr>
+          <p:cNvPr id="5" name="Title 1">
+            <a:extLst>
+              <a:ext uri="{FF2B5EF4-FFF2-40B4-BE49-F238E27FC236}">
+                <a16:creationId xmlns:a16="http://schemas.microsoft.com/office/drawing/2014/main" id="{AFB5D7D7-9E5C-4AD3-B6CB-833F4FD5F9D4}"/>
+              </a:ext>
+            </a:extLst>
+          </p:cNvPr>
+          <p:cNvSpPr txBox="1">
+            <a:spLocks/>
+          </p:cNvSpPr>
+          <p:nvPr/>
+        </p:nvSpPr>
+        <p:spPr>
+          <a:xfrm>
+            <a:off x="112336" y="-62354"/>
+            <a:ext cx="10515600" cy="1325563"/>
+          </a:xfrm>
+          <a:prstGeom prst="rect">
+            <a:avLst/>
+          </a:prstGeom>
+        </p:spPr>
+        <p:txBody>
+          <a:bodyPr vert="horz" lIns="91440" tIns="45720" rIns="91440" bIns="45720" rtlCol="0" anchor="ctr">
+            <a:normAutofit/>
+          </a:bodyPr>
+          <a:lstStyle>
+            <a:lvl1pPr algn="l" defTabSz="914400" rtl="0" eaLnBrk="1" latinLnBrk="0" hangingPunct="1">
+              <a:lnSpc>
+                <a:spcPct val="90000"/>
+              </a:lnSpc>
+              <a:spcBef>
+                <a:spcPct val="0"/>
+              </a:spcBef>
+              <a:buNone/>
+              <a:defRPr sz="4400" kern="1200">
+                <a:solidFill>
+                  <a:schemeClr val="tx1"/>
+                </a:solidFill>
+                <a:latin typeface="+mj-lt"/>
+                <a:ea typeface="+mj-ea"/>
+                <a:cs typeface="+mj-cs"/>
+              </a:defRPr>
+            </a:lvl1pPr>
+          </a:lstStyle>
+          <a:p>
+            <a:r>
+              <a:rPr lang="en-US" dirty="0"/>
+              <a:t>Important Learns</a:t>
+            </a:r>
+          </a:p>
+        </p:txBody>
+      </p:sp>
+      <p:sp>
+        <p:nvSpPr>
+          <p:cNvPr id="6" name="Content Placeholder 2">
+            <a:extLst>
+              <a:ext uri="{FF2B5EF4-FFF2-40B4-BE49-F238E27FC236}">
+                <a16:creationId xmlns:a16="http://schemas.microsoft.com/office/drawing/2014/main" id="{A2FC4C90-F7F3-4A44-936B-FE713D6091B5}"/>
+              </a:ext>
+            </a:extLst>
+          </p:cNvPr>
+          <p:cNvSpPr txBox="1">
+            <a:spLocks/>
+          </p:cNvSpPr>
+          <p:nvPr/>
+        </p:nvSpPr>
+        <p:spPr>
+          <a:xfrm>
+            <a:off x="294586" y="1067307"/>
+            <a:ext cx="12073379" cy="2783339"/>
+          </a:xfrm>
+          <a:prstGeom prst="rect">
+            <a:avLst/>
+          </a:prstGeom>
+        </p:spPr>
+        <p:txBody>
+          <a:bodyPr vert="horz" lIns="91440" tIns="45720" rIns="91440" bIns="45720" rtlCol="0">
+            <a:normAutofit fontScale="77500" lnSpcReduction="20000"/>
+          </a:bodyPr>
+          <a:lstStyle>
+            <a:lvl1pPr marL="228600" indent="-228600" algn="l" defTabSz="914400" rtl="0" eaLnBrk="1" latinLnBrk="0" hangingPunct="1">
+              <a:lnSpc>
+                <a:spcPct val="90000"/>
+              </a:lnSpc>
+              <a:spcBef>
+                <a:spcPts val="1000"/>
+              </a:spcBef>
+              <a:buFont typeface="Arial" panose="020B0604020202020204" pitchFamily="34" charset="0"/>
+              <a:buChar char="•"/>
+              <a:defRPr sz="2800" kern="1200">
+                <a:solidFill>
+                  <a:schemeClr val="tx1"/>
+                </a:solidFill>
+                <a:latin typeface="+mn-lt"/>
+                <a:ea typeface="+mn-ea"/>
+                <a:cs typeface="+mn-cs"/>
+              </a:defRPr>
+            </a:lvl1pPr>
+            <a:lvl2pPr marL="685800" indent="-228600" algn="l" defTabSz="914400" rtl="0" eaLnBrk="1" latinLnBrk="0" hangingPunct="1">
+              <a:lnSpc>
+                <a:spcPct val="90000"/>
+              </a:lnSpc>
+              <a:spcBef>
+                <a:spcPts val="500"/>
+              </a:spcBef>
+              <a:buFont typeface="Arial" panose="020B0604020202020204" pitchFamily="34" charset="0"/>
+              <a:buChar char="•"/>
+              <a:defRPr sz="2400" kern="1200">
+                <a:solidFill>
+                  <a:schemeClr val="tx1"/>
+                </a:solidFill>
+                <a:latin typeface="+mn-lt"/>
+                <a:ea typeface="+mn-ea"/>
+                <a:cs typeface="+mn-cs"/>
+              </a:defRPr>
+            </a:lvl2pPr>
+            <a:lvl3pPr marL="1143000" indent="-228600" algn="l" defTabSz="914400" rtl="0" eaLnBrk="1" latinLnBrk="0" hangingPunct="1">
+              <a:lnSpc>
+                <a:spcPct val="90000"/>
+              </a:lnSpc>
+              <a:spcBef>
+                <a:spcPts val="500"/>
+              </a:spcBef>
+              <a:buFont typeface="Arial" panose="020B0604020202020204" pitchFamily="34" charset="0"/>
+              <a:buChar char="•"/>
+              <a:defRPr sz="2000" kern="1200">
+                <a:solidFill>
+                  <a:schemeClr val="tx1"/>
+                </a:solidFill>
+                <a:latin typeface="+mn-lt"/>
+                <a:ea typeface="+mn-ea"/>
+                <a:cs typeface="+mn-cs"/>
+              </a:defRPr>
+            </a:lvl3pPr>
+            <a:lvl4pPr marL="1600200" indent="-228600" algn="l" defTabSz="914400" rtl="0" eaLnBrk="1" latinLnBrk="0" hangingPunct="1">
+              <a:lnSpc>
+                <a:spcPct val="90000"/>
+              </a:lnSpc>
+              <a:spcBef>
+                <a:spcPts val="500"/>
+              </a:spcBef>
+              <a:buFont typeface="Arial" panose="020B0604020202020204" pitchFamily="34" charset="0"/>
+              <a:buChar char="•"/>
+              <a:defRPr sz="1800" kern="1200">
+                <a:solidFill>
+                  <a:schemeClr val="tx1"/>
+                </a:solidFill>
+                <a:latin typeface="+mn-lt"/>
+                <a:ea typeface="+mn-ea"/>
+                <a:cs typeface="+mn-cs"/>
+              </a:defRPr>
+            </a:lvl4pPr>
+            <a:lvl5pPr marL="2057400" indent="-228600" algn="l" defTabSz="914400" rtl="0" eaLnBrk="1" latinLnBrk="0" hangingPunct="1">
+              <a:lnSpc>
+                <a:spcPct val="90000"/>
+              </a:lnSpc>
+              <a:spcBef>
+                <a:spcPts val="500"/>
+              </a:spcBef>
+              <a:buFont typeface="Arial" panose="020B0604020202020204" pitchFamily="34" charset="0"/>
+              <a:buChar char="•"/>
+              <a:defRPr sz="1800" kern="1200">
+                <a:solidFill>
+                  <a:schemeClr val="tx1"/>
+                </a:solidFill>
+                <a:latin typeface="+mn-lt"/>
+                <a:ea typeface="+mn-ea"/>
+                <a:cs typeface="+mn-cs"/>
+              </a:defRPr>
+            </a:lvl5pPr>
+            <a:lvl6pPr marL="2514600" indent="-228600" algn="l" defTabSz="914400" rtl="0" eaLnBrk="1" latinLnBrk="0" hangingPunct="1">
+              <a:lnSpc>
+                <a:spcPct val="90000"/>
+              </a:lnSpc>
+              <a:spcBef>
+                <a:spcPts val="500"/>
+              </a:spcBef>
+              <a:buFont typeface="Arial" panose="020B0604020202020204" pitchFamily="34" charset="0"/>
+              <a:buChar char="•"/>
+              <a:defRPr sz="1800" kern="1200">
+                <a:solidFill>
+                  <a:schemeClr val="tx1"/>
+                </a:solidFill>
+                <a:latin typeface="+mn-lt"/>
+                <a:ea typeface="+mn-ea"/>
+                <a:cs typeface="+mn-cs"/>
+              </a:defRPr>
+            </a:lvl6pPr>
+            <a:lvl7pPr marL="2971800" indent="-228600" algn="l" defTabSz="914400" rtl="0" eaLnBrk="1" latinLnBrk="0" hangingPunct="1">
+              <a:lnSpc>
+                <a:spcPct val="90000"/>
+              </a:lnSpc>
+              <a:spcBef>
+                <a:spcPts val="500"/>
+              </a:spcBef>
+              <a:buFont typeface="Arial" panose="020B0604020202020204" pitchFamily="34" charset="0"/>
+              <a:buChar char="•"/>
+              <a:defRPr sz="1800" kern="1200">
+                <a:solidFill>
+                  <a:schemeClr val="tx1"/>
+                </a:solidFill>
+                <a:latin typeface="+mn-lt"/>
+                <a:ea typeface="+mn-ea"/>
+                <a:cs typeface="+mn-cs"/>
+              </a:defRPr>
+            </a:lvl7pPr>
+            <a:lvl8pPr marL="3429000" indent="-228600" algn="l" defTabSz="914400" rtl="0" eaLnBrk="1" latinLnBrk="0" hangingPunct="1">
+              <a:lnSpc>
+                <a:spcPct val="90000"/>
+              </a:lnSpc>
+              <a:spcBef>
+                <a:spcPts val="500"/>
+              </a:spcBef>
+              <a:buFont typeface="Arial" panose="020B0604020202020204" pitchFamily="34" charset="0"/>
+              <a:buChar char="•"/>
+              <a:defRPr sz="1800" kern="1200">
+                <a:solidFill>
+                  <a:schemeClr val="tx1"/>
+                </a:solidFill>
+                <a:latin typeface="+mn-lt"/>
+                <a:ea typeface="+mn-ea"/>
+                <a:cs typeface="+mn-cs"/>
+              </a:defRPr>
+            </a:lvl8pPr>
+            <a:lvl9pPr marL="3886200" indent="-228600" algn="l" defTabSz="914400" rtl="0" eaLnBrk="1" latinLnBrk="0" hangingPunct="1">
+              <a:lnSpc>
+                <a:spcPct val="90000"/>
+              </a:lnSpc>
+              <a:spcBef>
+                <a:spcPts val="500"/>
+              </a:spcBef>
+              <a:buFont typeface="Arial" panose="020B0604020202020204" pitchFamily="34" charset="0"/>
+              <a:buChar char="•"/>
+              <a:defRPr sz="1800" kern="1200">
+                <a:solidFill>
+                  <a:schemeClr val="tx1"/>
+                </a:solidFill>
+                <a:latin typeface="+mn-lt"/>
+                <a:ea typeface="+mn-ea"/>
+                <a:cs typeface="+mn-cs"/>
+              </a:defRPr>
+            </a:lvl9pPr>
+          </a:lstStyle>
+          <a:p>
+            <a:r>
+              <a:rPr lang="en-US" dirty="0"/>
+              <a:t>Most likely this data has multiple variable interactions </a:t>
+            </a:r>
+          </a:p>
+          <a:p>
+            <a:pPr lvl="1"/>
+            <a:r>
+              <a:rPr lang="en-US" dirty="0"/>
+              <a:t>Output is due to many inputs</a:t>
+            </a:r>
+          </a:p>
+          <a:p>
+            <a:pPr lvl="1"/>
+            <a:r>
+              <a:rPr lang="en-US" dirty="0"/>
+              <a:t>Not explored with techniques used</a:t>
+            </a:r>
+          </a:p>
+          <a:p>
+            <a:r>
+              <a:rPr lang="en-US" dirty="0"/>
+              <a:t>Statistical models for each item may need to be developed</a:t>
+            </a:r>
+          </a:p>
+          <a:p>
+            <a:r>
+              <a:rPr lang="en-US" dirty="0"/>
+              <a:t>Use flexible code</a:t>
+            </a:r>
+          </a:p>
+          <a:p>
+            <a:pPr lvl="1"/>
+            <a:r>
+              <a:rPr lang="en-US" dirty="0"/>
+              <a:t>Use variables and don’t hard code. Allows for easy switch to new data.</a:t>
+            </a:r>
+          </a:p>
+          <a:p>
+            <a:r>
+              <a:rPr lang="en-US" dirty="0"/>
+              <a:t>Wrap each step in a function</a:t>
+            </a:r>
+          </a:p>
+          <a:p>
+            <a:pPr lvl="1"/>
+            <a:r>
+              <a:rPr lang="en-US" dirty="0"/>
+              <a:t>Allows for reuse of variable names</a:t>
+            </a:r>
+          </a:p>
+          <a:p>
+            <a:pPr lvl="1"/>
+            <a:r>
+              <a:rPr lang="en-US" dirty="0"/>
+              <a:t>Makes copy and pasting code easier</a:t>
+            </a:r>
+          </a:p>
+          <a:p>
+            <a:endParaRPr lang="en-US" dirty="0"/>
+          </a:p>
+          <a:p>
+            <a:endParaRPr lang="en-US" dirty="0"/>
+          </a:p>
+          <a:p>
+            <a:endParaRPr lang="en-US" dirty="0"/>
+          </a:p>
+          <a:p>
+            <a:pPr marL="0" indent="0">
+              <a:buFont typeface="Arial" panose="020B0604020202020204" pitchFamily="34" charset="0"/>
+              <a:buNone/>
+            </a:pPr>
+            <a:endParaRPr lang="en-US" dirty="0"/>
+          </a:p>
+        </p:txBody>
+      </p:sp>
+    </p:spTree>
+    <p:extLst>
+      <p:ext uri="{BB962C8B-B14F-4D97-AF65-F5344CB8AC3E}">
+        <p14:creationId xmlns:p14="http://schemas.microsoft.com/office/powerpoint/2010/main" val="2627251899"/>
+      </p:ext>
+    </p:extLst>
+  </p:cSld>
+  <p:clrMapOvr>
+    <a:masterClrMapping/>
+  </p:clrMapOvr>
+</p:sld>
+</file>
+
 <file path=ppt/slides/slide2.xml><?xml version="1.0" encoding="utf-8"?>
 <p:sld xmlns:a="http://schemas.openxmlformats.org/drawingml/2006/main" xmlns:r="http://schemas.openxmlformats.org/officeDocument/2006/relationships" xmlns:p="http://schemas.openxmlformats.org/presentationml/2006/main">
   <p:cSld>
@@ -3900,7 +4399,7 @@
         </p:spPr>
         <p:txBody>
           <a:bodyPr>
-            <a:normAutofit/>
+            <a:normAutofit lnSpcReduction="10000"/>
           </a:bodyPr>
           <a:lstStyle/>
           <a:p>
@@ -3914,6 +4413,13 @@
             <a:r>
               <a:rPr lang="en-US" dirty="0"/>
               <a:t>CSVs came from Amazon.com reports</a:t>
+            </a:r>
+          </a:p>
+          <a:p>
+            <a:pPr lvl="1"/>
+            <a:r>
+              <a:rPr lang="en-US" dirty="0"/>
+              <a:t>API Available but complex</a:t>
             </a:r>
           </a:p>
           <a:p>
@@ -4432,6 +4938,203 @@
 </file>
 
 <file path=ppt/slides/slide6.xml><?xml version="1.0" encoding="utf-8"?>
+<p:sld xmlns:a="http://schemas.openxmlformats.org/drawingml/2006/main" xmlns:r="http://schemas.openxmlformats.org/officeDocument/2006/relationships" xmlns:p="http://schemas.openxmlformats.org/presentationml/2006/main">
+  <p:cSld>
+    <p:spTree>
+      <p:nvGrpSpPr>
+        <p:cNvPr id="1" name=""/>
+        <p:cNvGrpSpPr/>
+        <p:nvPr/>
+      </p:nvGrpSpPr>
+      <p:grpSpPr>
+        <a:xfrm>
+          <a:off x="0" y="0"/>
+          <a:ext cx="0" cy="0"/>
+          <a:chOff x="0" y="0"/>
+          <a:chExt cx="0" cy="0"/>
+        </a:xfrm>
+      </p:grpSpPr>
+      <p:sp>
+        <p:nvSpPr>
+          <p:cNvPr id="2" name="Title 1">
+            <a:extLst>
+              <a:ext uri="{FF2B5EF4-FFF2-40B4-BE49-F238E27FC236}">
+                <a16:creationId xmlns:a16="http://schemas.microsoft.com/office/drawing/2014/main" id="{A746CE4B-D866-471A-86A4-2AAC4B3B7554}"/>
+              </a:ext>
+            </a:extLst>
+          </p:cNvPr>
+          <p:cNvSpPr>
+            <a:spLocks noGrp="1"/>
+          </p:cNvSpPr>
+          <p:nvPr>
+            <p:ph type="title"/>
+          </p:nvPr>
+        </p:nvSpPr>
+        <p:spPr>
+          <a:xfrm>
+            <a:off x="8125120" y="0"/>
+            <a:ext cx="3394435" cy="1325563"/>
+          </a:xfrm>
+        </p:spPr>
+        <p:txBody>
+          <a:bodyPr/>
+          <a:lstStyle/>
+          <a:p>
+            <a:r>
+              <a:rPr lang="en-US" dirty="0"/>
+              <a:t>Data Cleanup</a:t>
+            </a:r>
+          </a:p>
+        </p:txBody>
+      </p:sp>
+      <p:sp>
+        <p:nvSpPr>
+          <p:cNvPr id="3" name="Content Placeholder 2">
+            <a:extLst>
+              <a:ext uri="{FF2B5EF4-FFF2-40B4-BE49-F238E27FC236}">
+                <a16:creationId xmlns:a16="http://schemas.microsoft.com/office/drawing/2014/main" id="{296B37EB-D26C-4920-9278-7ACF81F14339}"/>
+              </a:ext>
+            </a:extLst>
+          </p:cNvPr>
+          <p:cNvSpPr>
+            <a:spLocks noGrp="1"/>
+          </p:cNvSpPr>
+          <p:nvPr>
+            <p:ph idx="1"/>
+          </p:nvPr>
+        </p:nvSpPr>
+        <p:spPr>
+          <a:xfrm>
+            <a:off x="84056" y="892372"/>
+            <a:ext cx="12107944" cy="5810086"/>
+          </a:xfrm>
+        </p:spPr>
+        <p:txBody>
+          <a:bodyPr/>
+          <a:lstStyle/>
+          <a:p>
+            <a:r>
+              <a:rPr lang="en-US" dirty="0"/>
+              <a:t>3 CSV file types</a:t>
+            </a:r>
+          </a:p>
+          <a:p>
+            <a:pPr lvl="1"/>
+            <a:r>
+              <a:rPr lang="en-US" dirty="0"/>
+              <a:t>Total of 6 CSVs</a:t>
+            </a:r>
+          </a:p>
+          <a:p>
+            <a:r>
+              <a:rPr lang="en-US" dirty="0"/>
+              <a:t>Merge into 2 master </a:t>
+            </a:r>
+            <a:r>
+              <a:rPr lang="en-US" dirty="0" err="1"/>
+              <a:t>dataframes</a:t>
+            </a:r>
+            <a:endParaRPr lang="en-US" dirty="0"/>
+          </a:p>
+          <a:p>
+            <a:pPr lvl="1"/>
+            <a:r>
+              <a:rPr lang="en-US" dirty="0"/>
+              <a:t>All other queries were ran on these </a:t>
+            </a:r>
+            <a:r>
+              <a:rPr lang="en-US" dirty="0" err="1"/>
+              <a:t>dfs</a:t>
+            </a:r>
+            <a:endParaRPr lang="en-US" dirty="0"/>
+          </a:p>
+          <a:p>
+            <a:r>
+              <a:rPr lang="en-US" dirty="0"/>
+              <a:t>Convert STR to appropriate datatype (int, datetime, float etc.. )</a:t>
+            </a:r>
+          </a:p>
+          <a:p>
+            <a:r>
+              <a:rPr lang="en-US" dirty="0"/>
+              <a:t>Converting timestamps to dates was critical</a:t>
+            </a:r>
+          </a:p>
+          <a:p>
+            <a:pPr lvl="1"/>
+            <a:r>
+              <a:rPr lang="en-US" dirty="0"/>
+              <a:t>A lot of data was grouped by dates</a:t>
+            </a:r>
+          </a:p>
+          <a:p>
+            <a:pPr lvl="1"/>
+            <a:r>
+              <a:rPr lang="en-US" dirty="0"/>
+              <a:t>Very challenging to work with time. </a:t>
+            </a:r>
+          </a:p>
+          <a:p>
+            <a:pPr lvl="2"/>
+            <a:r>
+              <a:rPr lang="en-US" dirty="0"/>
+              <a:t>Time zone aware vs naïve</a:t>
+            </a:r>
+          </a:p>
+          <a:p>
+            <a:pPr lvl="2"/>
+            <a:r>
+              <a:rPr lang="en-US" dirty="0"/>
+              <a:t>Many libraries to deal with time data. (None of them great)</a:t>
+            </a:r>
+          </a:p>
+          <a:p>
+            <a:r>
+              <a:rPr lang="en-US" dirty="0"/>
+              <a:t>Convert strings with % to floats</a:t>
+            </a:r>
+          </a:p>
+          <a:p>
+            <a:r>
+              <a:rPr lang="en-US" dirty="0"/>
+              <a:t>Many times errors were not obvious until plotting steps</a:t>
+            </a:r>
+          </a:p>
+          <a:p>
+            <a:pPr lvl="1"/>
+            <a:r>
+              <a:rPr lang="en-US" dirty="0"/>
+              <a:t>Caused a lot of recoding</a:t>
+            </a:r>
+          </a:p>
+          <a:p>
+            <a:endParaRPr lang="en-US" dirty="0"/>
+          </a:p>
+          <a:p>
+            <a:endParaRPr lang="en-US" dirty="0"/>
+          </a:p>
+          <a:p>
+            <a:endParaRPr lang="en-US" dirty="0"/>
+          </a:p>
+          <a:p>
+            <a:endParaRPr lang="en-US" dirty="0"/>
+          </a:p>
+        </p:txBody>
+      </p:sp>
+    </p:spTree>
+    <p:extLst>
+      <p:ext uri="{BB962C8B-B14F-4D97-AF65-F5344CB8AC3E}">
+        <p14:creationId xmlns:p14="http://schemas.microsoft.com/office/powerpoint/2010/main" val="2477088661"/>
+      </p:ext>
+    </p:extLst>
+  </p:cSld>
+  <p:clrMapOvr>
+    <a:masterClrMapping/>
+  </p:clrMapOvr>
+</p:sld>
+</file>
+
+<file path=ppt/slides/slide7.xml><?xml version="1.0" encoding="utf-8"?>
 <p:sld xmlns:a="http://schemas.openxmlformats.org/drawingml/2006/main" xmlns:r="http://schemas.openxmlformats.org/officeDocument/2006/relationships" xmlns:p="http://schemas.openxmlformats.org/presentationml/2006/main">
   <p:cSld>
     <p:spTree>
@@ -4812,7 +5515,7 @@
 </p:sld>
 </file>
 
-<file path=ppt/slides/slide7.xml><?xml version="1.0" encoding="utf-8"?>
+<file path=ppt/slides/slide8.xml><?xml version="1.0" encoding="utf-8"?>
 <p:sld xmlns:a="http://schemas.openxmlformats.org/drawingml/2006/main" xmlns:r="http://schemas.openxmlformats.org/officeDocument/2006/relationships" xmlns:p="http://schemas.openxmlformats.org/presentationml/2006/main">
   <p:cSld>
     <p:spTree>
@@ -4977,7 +5680,7 @@
 </p:sld>
 </file>
 
-<file path=ppt/slides/slide8.xml><?xml version="1.0" encoding="utf-8"?>
+<file path=ppt/slides/slide9.xml><?xml version="1.0" encoding="utf-8"?>
 <p:sld xmlns:a="http://schemas.openxmlformats.org/drawingml/2006/main" xmlns:r="http://schemas.openxmlformats.org/officeDocument/2006/relationships" xmlns:p="http://schemas.openxmlformats.org/presentationml/2006/main">
   <p:cSld>
     <p:spTree>
@@ -5162,177 +5865,6 @@
     <p:extLst>
       <p:ext uri="{BB962C8B-B14F-4D97-AF65-F5344CB8AC3E}">
         <p14:creationId xmlns:p14="http://schemas.microsoft.com/office/powerpoint/2010/main" val="3933462202"/>
-      </p:ext>
-    </p:extLst>
-  </p:cSld>
-  <p:clrMapOvr>
-    <a:masterClrMapping/>
-  </p:clrMapOvr>
-</p:sld>
-</file>
-
-<file path=ppt/slides/slide9.xml><?xml version="1.0" encoding="utf-8"?>
-<p:sld xmlns:a="http://schemas.openxmlformats.org/drawingml/2006/main" xmlns:r="http://schemas.openxmlformats.org/officeDocument/2006/relationships" xmlns:p="http://schemas.openxmlformats.org/presentationml/2006/main">
-  <p:cSld>
-    <p:spTree>
-      <p:nvGrpSpPr>
-        <p:cNvPr id="1" name=""/>
-        <p:cNvGrpSpPr/>
-        <p:nvPr/>
-      </p:nvGrpSpPr>
-      <p:grpSpPr>
-        <a:xfrm>
-          <a:off x="0" y="0"/>
-          <a:ext cx="0" cy="0"/>
-          <a:chOff x="0" y="0"/>
-          <a:chExt cx="0" cy="0"/>
-        </a:xfrm>
-      </p:grpSpPr>
-      <p:sp>
-        <p:nvSpPr>
-          <p:cNvPr id="2" name="Title 1">
-            <a:extLst>
-              <a:ext uri="{FF2B5EF4-FFF2-40B4-BE49-F238E27FC236}">
-                <a16:creationId xmlns:a16="http://schemas.microsoft.com/office/drawing/2014/main" id="{8176E52F-1353-4CE6-AB22-7FCE202250F4}"/>
-              </a:ext>
-            </a:extLst>
-          </p:cNvPr>
-          <p:cNvSpPr>
-            <a:spLocks noGrp="1"/>
-          </p:cNvSpPr>
-          <p:nvPr>
-            <p:ph type="title"/>
-          </p:nvPr>
-        </p:nvSpPr>
-        <p:spPr/>
-        <p:txBody>
-          <a:bodyPr/>
-          <a:lstStyle/>
-          <a:p>
-            <a:r>
-              <a:rPr lang="en-US" dirty="0"/>
-              <a:t>Future Considerations</a:t>
-            </a:r>
-          </a:p>
-        </p:txBody>
-      </p:sp>
-      <p:sp>
-        <p:nvSpPr>
-          <p:cNvPr id="3" name="Content Placeholder 2">
-            <a:extLst>
-              <a:ext uri="{FF2B5EF4-FFF2-40B4-BE49-F238E27FC236}">
-                <a16:creationId xmlns:a16="http://schemas.microsoft.com/office/drawing/2014/main" id="{D1F36D57-EB51-459C-BC47-FE4A9EBD56F6}"/>
-              </a:ext>
-            </a:extLst>
-          </p:cNvPr>
-          <p:cNvSpPr>
-            <a:spLocks noGrp="1"/>
-          </p:cNvSpPr>
-          <p:nvPr>
-            <p:ph idx="1"/>
-          </p:nvPr>
-        </p:nvSpPr>
-        <p:spPr>
-          <a:xfrm>
-            <a:off x="838200" y="1825625"/>
-            <a:ext cx="10515600" cy="1325563"/>
-          </a:xfrm>
-        </p:spPr>
-        <p:txBody>
-          <a:bodyPr>
-            <a:normAutofit fontScale="92500" lnSpcReduction="10000"/>
-          </a:bodyPr>
-          <a:lstStyle/>
-          <a:p>
-            <a:r>
-              <a:rPr lang="en-US" dirty="0"/>
-              <a:t>Add more data</a:t>
-            </a:r>
-          </a:p>
-          <a:p>
-            <a:r>
-              <a:rPr lang="en-US" dirty="0"/>
-              <a:t>Automated reporting through API</a:t>
-            </a:r>
-          </a:p>
-          <a:p>
-            <a:r>
-              <a:rPr lang="en-US" dirty="0"/>
-              <a:t>Automated adjustments on advertising or price</a:t>
-            </a:r>
-          </a:p>
-          <a:p>
-            <a:endParaRPr lang="en-US" dirty="0"/>
-          </a:p>
-          <a:p>
-            <a:endParaRPr lang="en-US" dirty="0"/>
-          </a:p>
-          <a:p>
-            <a:pPr marL="0" indent="0">
-              <a:buNone/>
-            </a:pPr>
-            <a:endParaRPr lang="en-US" dirty="0"/>
-          </a:p>
-        </p:txBody>
-      </p:sp>
-      <p:sp>
-        <p:nvSpPr>
-          <p:cNvPr id="4" name="Title 1">
-            <a:extLst>
-              <a:ext uri="{FF2B5EF4-FFF2-40B4-BE49-F238E27FC236}">
-                <a16:creationId xmlns:a16="http://schemas.microsoft.com/office/drawing/2014/main" id="{B8B5D1E9-610D-4427-8167-EC921DC2A02F}"/>
-              </a:ext>
-            </a:extLst>
-          </p:cNvPr>
-          <p:cNvSpPr txBox="1">
-            <a:spLocks/>
-          </p:cNvSpPr>
-          <p:nvPr/>
-        </p:nvSpPr>
-        <p:spPr>
-          <a:xfrm>
-            <a:off x="4223994" y="4533342"/>
-            <a:ext cx="10515600" cy="1325563"/>
-          </a:xfrm>
-          <a:prstGeom prst="rect">
-            <a:avLst/>
-          </a:prstGeom>
-        </p:spPr>
-        <p:txBody>
-          <a:bodyPr vert="horz" lIns="91440" tIns="45720" rIns="91440" bIns="45720" rtlCol="0" anchor="ctr">
-            <a:normAutofit/>
-          </a:bodyPr>
-          <a:lstStyle>
-            <a:lvl1pPr algn="l" defTabSz="914400" rtl="0" eaLnBrk="1" latinLnBrk="0" hangingPunct="1">
-              <a:lnSpc>
-                <a:spcPct val="90000"/>
-              </a:lnSpc>
-              <a:spcBef>
-                <a:spcPct val="0"/>
-              </a:spcBef>
-              <a:buNone/>
-              <a:defRPr sz="4400" kern="1200">
-                <a:solidFill>
-                  <a:schemeClr val="tx1"/>
-                </a:solidFill>
-                <a:latin typeface="+mj-lt"/>
-                <a:ea typeface="+mj-ea"/>
-                <a:cs typeface="+mj-cs"/>
-              </a:defRPr>
-            </a:lvl1pPr>
-          </a:lstStyle>
-          <a:p>
-            <a:r>
-              <a:rPr lang="en-US" dirty="0"/>
-              <a:t>Thank You!!!</a:t>
-            </a:r>
-          </a:p>
-        </p:txBody>
-      </p:sp>
-    </p:spTree>
-    <p:extLst>
-      <p:ext uri="{BB962C8B-B14F-4D97-AF65-F5344CB8AC3E}">
-        <p14:creationId xmlns:p14="http://schemas.microsoft.com/office/powerpoint/2010/main" val="2627251899"/>
       </p:ext>
     </p:extLst>
   </p:cSld>

</xml_diff>